<commit_message>
changed present tense to past tense in final presentation.
</commit_message>
<xml_diff>
--- a/Final Prez.pptx
+++ b/Final Prez.pptx
@@ -114,6 +114,10 @@
     </p:ext>
   </p:extLst>
 </p:presentation>
+</file>
+
+<file path=ppt/revisionInfo.xml><?xml version="1.0" encoding="utf-8"?>
+<p1510:revInfo xmlns:a="http://schemas.openxmlformats.org/drawingml/2006/main" xmlns:r="http://schemas.openxmlformats.org/officeDocument/2006/relationships" xmlns:p1510="http://schemas.microsoft.com/office/powerpoint/2015/10/main"/>
 </file>
 
 <file path=ppt/slideLayouts/slideLayout1.xml><?xml version="1.0" encoding="utf-8"?>
@@ -5558,13 +5562,8 @@
             </a:pPr>
             <a:r>
               <a:rPr lang="en-US" sz="2000" dirty="0"/>
-              <a:t>Uses Excel to </a:t>
-            </a:r>
-            <a:r>
-              <a:rPr lang="en-US" sz="2000"/>
-              <a:t>store all information</a:t>
-            </a:r>
-            <a:endParaRPr lang="en-US" sz="2000" dirty="0"/>
+              <a:t>Used Excel to store all information</a:t>
+            </a:r>
           </a:p>
           <a:p>
             <a:pPr marL="285750" indent="-285750">
@@ -5573,7 +5572,7 @@
             </a:pPr>
             <a:r>
               <a:rPr lang="en-US" sz="2000" dirty="0"/>
-              <a:t>Has to manually input each line of items from a PO or Invoice</a:t>
+              <a:t>Had to manually input each line of items from a PO or Invoice</a:t>
             </a:r>
           </a:p>
           <a:p>
@@ -5583,7 +5582,7 @@
             </a:pPr>
             <a:r>
               <a:rPr lang="en-US" sz="2000" dirty="0"/>
-              <a:t>Cannot track more than 80 items per page, if more than that receiving  must manually create a second log and save it as a separate file</a:t>
+              <a:t>Could not track more than 80 items per page, if more than that receiving  must manually create a second log and save it as a separate file</a:t>
             </a:r>
           </a:p>
         </p:txBody>

</xml_diff>